<commit_message>
change path for pandas
</commit_message>
<xml_diff>
--- a/docs/slides/005_NumPy_pandas.pptx
+++ b/docs/slides/005_NumPy_pandas.pptx
@@ -305,8 +305,40 @@
 </p:presentation>
 </file>
 
+<file path=ppt/revisionInfo.xml><?xml version="1.0" encoding="utf-8"?>
+<p1510:revInfo xmlns:a="http://schemas.openxmlformats.org/drawingml/2006/main" xmlns:r="http://schemas.openxmlformats.org/officeDocument/2006/relationships" xmlns:p1510="http://schemas.microsoft.com/office/powerpoint/2015/10/main">
+  <p1510:revLst>
+    <p1510:client id="{CCE539BC-8D43-4922-8CC0-835F2441561B}" v="23" dt="2024-10-15T14:19:22.991"/>
+  </p1510:revLst>
+</p1510:revInfo>
+</file>
+
 <file path=ppt/changesInfos/changesInfo1.xml><?xml version="1.0" encoding="utf-8"?>
 <pc:chgInfo xmlns:a="http://schemas.openxmlformats.org/drawingml/2006/main" xmlns:r="http://schemas.openxmlformats.org/officeDocument/2006/relationships" xmlns:ac="http://schemas.microsoft.com/office/drawing/2013/main/command" xmlns:pc="http://schemas.microsoft.com/office/powerpoint/2013/main/command">
+  <pc:docChgLst>
+    <pc:chgData name="Kredel, Ralf (ISPW)" userId="7d79eab3-2c23-40d0-a5da-72f3747f24e8" providerId="ADAL" clId="{CCE539BC-8D43-4922-8CC0-835F2441561B}"/>
+    <pc:docChg chg="modSld">
+      <pc:chgData name="Kredel, Ralf (ISPW)" userId="7d79eab3-2c23-40d0-a5da-72f3747f24e8" providerId="ADAL" clId="{CCE539BC-8D43-4922-8CC0-835F2441561B}" dt="2024-10-15T14:19:22.176" v="21" actId="20577"/>
+      <pc:docMkLst>
+        <pc:docMk/>
+      </pc:docMkLst>
+      <pc:sldChg chg="modSp">
+        <pc:chgData name="Kredel, Ralf (ISPW)" userId="7d79eab3-2c23-40d0-a5da-72f3747f24e8" providerId="ADAL" clId="{CCE539BC-8D43-4922-8CC0-835F2441561B}" dt="2024-10-15T14:19:22.176" v="21" actId="20577"/>
+        <pc:sldMkLst>
+          <pc:docMk/>
+          <pc:sldMk cId="2328180117" sldId="314"/>
+        </pc:sldMkLst>
+        <pc:spChg chg="mod">
+          <ac:chgData name="Kredel, Ralf (ISPW)" userId="7d79eab3-2c23-40d0-a5da-72f3747f24e8" providerId="ADAL" clId="{CCE539BC-8D43-4922-8CC0-835F2441561B}" dt="2024-10-15T14:19:22.176" v="21" actId="20577"/>
+          <ac:spMkLst>
+            <pc:docMk/>
+            <pc:sldMk cId="2328180117" sldId="314"/>
+            <ac:spMk id="3" creationId="{4FD85A3C-198C-4C64-97E5-5045D97E2CEE}"/>
+          </ac:spMkLst>
+        </pc:spChg>
+      </pc:sldChg>
+    </pc:docChg>
+  </pc:docChgLst>
   <pc:docChgLst>
     <pc:chgData name="Kredel, Ralf (ISPW)" userId="7d79eab3-2c23-40d0-a5da-72f3747f24e8" providerId="ADAL" clId="{74F892A9-41BB-497B-A543-043C9D5FEA61}"/>
     <pc:docChg chg="custSel modSld">
@@ -12294,7 +12326,19 @@
               <a:rPr lang="de-CH" dirty="0">
                 <a:hlinkClick r:id="rId3"/>
               </a:rPr>
-              <a:t>https://github.com/ssr-2023/ssr2023/wiki/300_pandas_in_5min.md</a:t>
+              <a:t>https://github.com/</a:t>
+            </a:r>
+            <a:r>
+              <a:rPr lang="de-CH">
+                <a:hlinkClick r:id="rId3"/>
+              </a:rPr>
+              <a:t>ssr-2024/programming_basics/</a:t>
+            </a:r>
+            <a:r>
+              <a:rPr lang="de-CH" dirty="0">
+                <a:hlinkClick r:id="rId3"/>
+              </a:rPr>
+              <a:t>wiki/300_pandas_in_5min.md</a:t>
             </a:r>
             <a:endParaRPr lang="de-CH" dirty="0"/>
           </a:p>

</xml_diff>